<commit_message>
feat(vf84-qualif): add planes on red side
</commit_message>
<xml_diff>
--- a/vf84-qualification/resources/briefing.pptx
+++ b/vf84-qualification/resources/briefing.pptx
@@ -118,6 +118,9 @@
     <p:ext uri="{EFAFB233-063F-42B5-8137-9DF3F51BA10A}">
       <p15:sldGuideLst xmlns:p15="http://schemas.microsoft.com/office/powerpoint/2012/main"/>
     </p:ext>
+    <p:ext uri="{2D200454-40CA-4A62-9FC3-DE9A4176ACB9}">
+      <p15:notesGuideLst xmlns:p15="http://schemas.microsoft.com/office/powerpoint/2012/main"/>
+    </p:ext>
   </p:extLst>
 </p:presentation>
 </file>
@@ -204,7 +207,7 @@
           <a:p>
             <a:fld id="{AA996658-3179-4509-8D2B-78FEF919027E}" type="datetimeFigureOut">
               <a:rPr lang="fr-FR" smtClean="0"/>
-              <a:t>22/05/2020</a:t>
+              <a:t>11/11/2020</a:t>
             </a:fld>
             <a:endParaRPr lang="fr-FR"/>
           </a:p>
@@ -1013,7 +1016,7 @@
           <a:p>
             <a:fld id="{BA9189A3-ADF0-4222-AF52-92A98061C2FB}" type="datetimeFigureOut">
               <a:rPr lang="fr-FR" smtClean="0"/>
-              <a:t>22/05/2020</a:t>
+              <a:t>11/11/2020</a:t>
             </a:fld>
             <a:endParaRPr lang="fr-FR"/>
           </a:p>
@@ -1440,11 +1443,7 @@
           <a:p>
             <a:r>
               <a:rPr lang="fr-FR" dirty="0" smtClean="0"/>
-              <a:t>VF84 </a:t>
-            </a:r>
-            <a:r>
-              <a:rPr lang="fr-FR" dirty="0" smtClean="0"/>
-              <a:t>QUALIFICATIONS</a:t>
+              <a:t>VF84 QUALIFICATIONS</a:t>
             </a:r>
             <a:endParaRPr lang="fr-FR" dirty="0"/>
           </a:p>
@@ -1468,7 +1467,7 @@
         </p:spPr>
         <p:txBody>
           <a:bodyPr>
-            <a:normAutofit/>
+            <a:normAutofit fontScale="92500"/>
           </a:bodyPr>
           <a:lstStyle/>
           <a:p>
@@ -1477,7 +1476,7 @@
             </a:pPr>
             <a:r>
               <a:rPr lang="fr-FR" dirty="0" smtClean="0"/>
-              <a:t>22.05.20</a:t>
+              <a:t>Update 11.11.2020</a:t>
             </a:r>
             <a:endParaRPr lang="fr-FR" dirty="0"/>
           </a:p>
@@ -1579,7 +1578,6 @@
               <a:rPr lang="fr-FR" sz="2000" dirty="0" smtClean="0"/>
               <a:t>la VF84 Jolly Rogers.</a:t>
             </a:r>
-            <a:endParaRPr lang="fr-FR" sz="2000" dirty="0" smtClean="0"/>
           </a:p>
           <a:p>
             <a:pPr marL="0" indent="0">
@@ -1619,7 +1617,6 @@
               <a:rPr lang="fr-FR" sz="2000" dirty="0" smtClean="0"/>
               <a:t>VF84</a:t>
             </a:r>
-            <a:endParaRPr lang="fr-FR" sz="2000" dirty="0" smtClean="0"/>
           </a:p>
           <a:p>
             <a:pPr marL="0" indent="0">
@@ -1659,7 +1656,6 @@
               <a:rPr lang="fr-FR" sz="1600" dirty="0" smtClean="0"/>
               <a:t>USS Theodore Roosevelt</a:t>
             </a:r>
-            <a:endParaRPr lang="fr-FR" sz="1600" dirty="0" smtClean="0"/>
           </a:p>
           <a:p>
             <a:endParaRPr lang="fr-FR" sz="1600" dirty="0"/>
@@ -1911,11 +1907,7 @@
             <a:pPr lvl="2"/>
             <a:r>
               <a:rPr lang="fr-FR" sz="1200" dirty="0" smtClean="0"/>
-              <a:t>2 </a:t>
-            </a:r>
-            <a:r>
-              <a:rPr lang="fr-FR" sz="1200" dirty="0" smtClean="0"/>
-              <a:t>Su33 (départ du </a:t>
+              <a:t>2 Su33 (départ du </a:t>
             </a:r>
             <a:r>
               <a:rPr lang="fr-FR" sz="1200" dirty="0" err="1" smtClean="0"/>
@@ -1925,7 +1917,6 @@
               <a:rPr lang="fr-FR" sz="1200" dirty="0" smtClean="0"/>
               <a:t>)</a:t>
             </a:r>
-            <a:endParaRPr lang="fr-FR" sz="1200" dirty="0" smtClean="0"/>
           </a:p>
           <a:p>
             <a:pPr lvl="2"/>
@@ -2345,17 +2336,26 @@
               <a:t>KC135 MPRS Texaco escorté en </a:t>
             </a:r>
             <a:r>
-              <a:rPr lang="fr-FR" sz="1600" dirty="0" err="1"/>
-              <a:t>hyppodrome</a:t>
+              <a:rPr lang="fr-FR" sz="1600" dirty="0" smtClean="0"/>
+              <a:t>hippodrome </a:t>
             </a:r>
             <a:r>
               <a:rPr lang="fr-FR" sz="1600" dirty="0"/>
-              <a:t> au dessus de </a:t>
+              <a:t>au dessus de </a:t>
             </a:r>
             <a:r>
               <a:rPr lang="fr-FR" sz="1600" dirty="0" smtClean="0"/>
-              <a:t>Senaki</a:t>
-            </a:r>
+              <a:t>Senaki. (</a:t>
+            </a:r>
+            <a:r>
+              <a:rPr lang="fr-FR" sz="1600" dirty="0" err="1" smtClean="0"/>
+              <a:t>re-spawnable</a:t>
+            </a:r>
+            <a:r>
+              <a:rPr lang="fr-FR" sz="1600" dirty="0" smtClean="0"/>
+              <a:t> avec le menu F10)</a:t>
+            </a:r>
+            <a:endParaRPr lang="fr-FR" sz="1600" dirty="0" smtClean="0"/>
           </a:p>
           <a:p>
             <a:pPr lvl="1"/>
@@ -2364,48 +2364,22 @@
               <a:t>1 S3 Viking </a:t>
             </a:r>
             <a:r>
+              <a:rPr lang="fr-FR" sz="1600" dirty="0" smtClean="0"/>
+              <a:t>en hippodrome </a:t>
+            </a:r>
+            <a:r>
               <a:rPr lang="fr-FR" sz="1600" dirty="0"/>
-              <a:t>escorté en </a:t>
-            </a:r>
-            <a:r>
-              <a:rPr lang="fr-FR" sz="1600" dirty="0" err="1"/>
-              <a:t>hyppodrome</a:t>
-            </a:r>
-            <a:r>
-              <a:rPr lang="fr-FR" sz="1600" dirty="0"/>
-              <a:t> au dessus du </a:t>
-            </a:r>
-            <a:r>
-              <a:rPr lang="fr-FR" sz="1600" dirty="0" err="1" smtClean="0"/>
-              <a:t>Stennis</a:t>
+              <a:t>au dessus du </a:t>
+            </a:r>
+            <a:r>
+              <a:rPr lang="fr-FR" sz="1600" dirty="0" smtClean="0"/>
+              <a:t>Roosevelt</a:t>
+            </a:r>
+            <a:r>
+              <a:rPr lang="fr-FR" sz="1600" dirty="0" smtClean="0"/>
+              <a:t>.</a:t>
             </a:r>
             <a:endParaRPr lang="fr-FR" sz="1600" dirty="0" smtClean="0"/>
-          </a:p>
-          <a:p>
-            <a:pPr marL="457200" lvl="1" indent="0">
-              <a:buNone/>
-            </a:pPr>
-            <a:r>
-              <a:rPr lang="fr-FR" sz="1600" dirty="0" smtClean="0"/>
-              <a:t>Les </a:t>
-            </a:r>
-            <a:r>
-              <a:rPr lang="fr-FR" sz="1600" dirty="0"/>
-              <a:t>2 Tankers sont </a:t>
-            </a:r>
-            <a:r>
-              <a:rPr lang="fr-FR" sz="1600" dirty="0" err="1" smtClean="0"/>
-              <a:t>re-spawnables</a:t>
-            </a:r>
-            <a:r>
-              <a:rPr lang="fr-FR" sz="1600" dirty="0" smtClean="0"/>
-              <a:t> </a:t>
-            </a:r>
-            <a:r>
-              <a:rPr lang="fr-FR" sz="1600" dirty="0"/>
-              <a:t>avec le menu F10</a:t>
-            </a:r>
-            <a:endParaRPr lang="fr-FR" sz="1200" dirty="0" smtClean="0"/>
           </a:p>
         </p:txBody>
       </p:sp>
@@ -2491,46 +2465,8 @@
             </a:pPr>
             <a:r>
               <a:rPr lang="fr-FR" sz="2400" dirty="0" smtClean="0"/>
-              <a:t>CAVOK</a:t>
-            </a:r>
-          </a:p>
-          <a:p>
-            <a:pPr marL="0" indent="0">
-              <a:buNone/>
-            </a:pPr>
-            <a:endParaRPr lang="fr-FR" sz="2400" dirty="0" smtClean="0"/>
-          </a:p>
-          <a:p>
-            <a:pPr marL="0" indent="0">
-              <a:buNone/>
-            </a:pPr>
-            <a:r>
-              <a:rPr lang="fr-FR" sz="2400" dirty="0" smtClean="0"/>
-              <a:t>0.0K-6KTS-166</a:t>
-            </a:r>
-          </a:p>
-          <a:p>
-            <a:pPr marL="0" indent="0">
-              <a:buNone/>
-            </a:pPr>
-            <a:r>
-              <a:rPr lang="fr-FR" sz="2400" dirty="0" smtClean="0"/>
-              <a:t>6.6K-20KTS-118</a:t>
-            </a:r>
-          </a:p>
-          <a:p>
-            <a:pPr marL="0" indent="0">
-              <a:buNone/>
-            </a:pPr>
-            <a:r>
-              <a:rPr lang="fr-FR" sz="2400" dirty="0" smtClean="0"/>
-              <a:t>26K-30KTS-094</a:t>
-            </a:r>
-          </a:p>
-          <a:p>
-            <a:pPr marL="0" indent="0">
-              <a:buNone/>
-            </a:pPr>
+              <a:t>METAR 34010KT 9999 SCT019 26 Q1006 RMK FBL TURB BLU=</a:t>
+            </a:r>
             <a:endParaRPr lang="fr-FR" sz="2400" dirty="0"/>
           </a:p>
         </p:txBody>
@@ -2613,7 +2549,7 @@
         </p:spPr>
         <p:txBody>
           <a:bodyPr>
-            <a:normAutofit fontScale="92500" lnSpcReduction="10000"/>
+            <a:normAutofit fontScale="70000" lnSpcReduction="20000"/>
           </a:bodyPr>
           <a:lstStyle/>
           <a:p>
@@ -2684,8 +2620,45 @@
             </a:r>
             <a:r>
               <a:rPr lang="fr-FR" dirty="0" smtClean="0"/>
-              <a:t>: Silver1</a:t>
-            </a:r>
+              <a:t>: </a:t>
+            </a:r>
+            <a:r>
+              <a:rPr lang="fr-FR" dirty="0" smtClean="0"/>
+              <a:t>Silver1</a:t>
+            </a:r>
+          </a:p>
+          <a:p>
+            <a:pPr lvl="1"/>
+            <a:endParaRPr lang="fr-FR" dirty="0"/>
+          </a:p>
+          <a:p>
+            <a:r>
+              <a:rPr lang="fr-FR" dirty="0" err="1" smtClean="0"/>
+              <a:t>Wizzard</a:t>
+            </a:r>
+            <a:r>
+              <a:rPr lang="fr-FR" dirty="0" smtClean="0"/>
+              <a:t> : E2</a:t>
+            </a:r>
+          </a:p>
+          <a:p>
+            <a:pPr lvl="1"/>
+            <a:r>
+              <a:rPr lang="fr-FR" dirty="0" err="1" smtClean="0"/>
+              <a:t>Freq</a:t>
+            </a:r>
+            <a:r>
+              <a:rPr lang="fr-FR" dirty="0" smtClean="0"/>
+              <a:t>: Silver2</a:t>
+            </a:r>
+          </a:p>
+          <a:p>
+            <a:pPr lvl="1"/>
+            <a:r>
+              <a:rPr lang="fr-FR" dirty="0" smtClean="0"/>
+              <a:t>TACAN: 16Y</a:t>
+            </a:r>
+            <a:endParaRPr lang="fr-FR" dirty="0" smtClean="0"/>
           </a:p>
         </p:txBody>
       </p:sp>
@@ -2877,44 +2850,26 @@
           <a:p>
             <a:r>
               <a:rPr lang="fr-FR" dirty="0" smtClean="0"/>
-              <a:t>USS </a:t>
-            </a:r>
-            <a:r>
-              <a:rPr lang="fr-FR" dirty="0" smtClean="0"/>
-              <a:t>Roosevelt:</a:t>
-            </a:r>
-            <a:endParaRPr lang="fr-FR" dirty="0" smtClean="0"/>
+              <a:t>USS Roosevelt:</a:t>
+            </a:r>
           </a:p>
           <a:p>
             <a:pPr lvl="1"/>
             <a:r>
               <a:rPr lang="fr-FR" dirty="0" smtClean="0"/>
-              <a:t>BRC 360</a:t>
+              <a:t>ICLS</a:t>
+            </a:r>
+            <a:r>
+              <a:rPr lang="fr-FR" dirty="0" smtClean="0"/>
+              <a:t>: 11</a:t>
             </a:r>
           </a:p>
           <a:p>
             <a:pPr lvl="1"/>
             <a:r>
               <a:rPr lang="fr-FR" dirty="0" smtClean="0"/>
-              <a:t>ICLS: </a:t>
-            </a:r>
-            <a:r>
-              <a:rPr lang="fr-FR" dirty="0" smtClean="0"/>
-              <a:t>11</a:t>
-            </a:r>
-            <a:endParaRPr lang="fr-FR" dirty="0" smtClean="0"/>
-          </a:p>
-          <a:p>
-            <a:pPr lvl="1"/>
-            <a:r>
-              <a:rPr lang="fr-FR" dirty="0" smtClean="0"/>
-              <a:t>TACAN: </a:t>
-            </a:r>
-            <a:r>
-              <a:rPr lang="fr-FR" dirty="0" smtClean="0"/>
-              <a:t>71X</a:t>
-            </a:r>
-            <a:endParaRPr lang="fr-FR" dirty="0" smtClean="0"/>
+              <a:t>TACAN: 71X</a:t>
+            </a:r>
           </a:p>
           <a:p>
             <a:pPr lvl="1"/>
@@ -2924,8 +2879,38 @@
             </a:r>
             <a:r>
               <a:rPr lang="fr-FR" dirty="0" smtClean="0"/>
-              <a:t>: Black1</a:t>
-            </a:r>
+              <a:t>: </a:t>
+            </a:r>
+            <a:r>
+              <a:rPr lang="fr-FR" dirty="0" smtClean="0"/>
+              <a:t>Black1</a:t>
+            </a:r>
+          </a:p>
+          <a:p>
+            <a:pPr lvl="1"/>
+            <a:r>
+              <a:rPr lang="fr-FR" dirty="0" err="1" smtClean="0"/>
+              <a:t>Airboss</a:t>
+            </a:r>
+            <a:r>
+              <a:rPr lang="fr-FR" dirty="0" smtClean="0"/>
+              <a:t> :</a:t>
+            </a:r>
+          </a:p>
+          <a:p>
+            <a:pPr lvl="2"/>
+            <a:r>
+              <a:rPr lang="fr-FR" dirty="0" smtClean="0"/>
+              <a:t>Marshall : Black2</a:t>
+            </a:r>
+          </a:p>
+          <a:p>
+            <a:pPr lvl="2"/>
+            <a:r>
+              <a:rPr lang="fr-FR" dirty="0" smtClean="0"/>
+              <a:t>LSO : Black3</a:t>
+            </a:r>
+            <a:endParaRPr lang="fr-FR" dirty="0" smtClean="0"/>
           </a:p>
           <a:p>
             <a:endParaRPr lang="fr-FR" dirty="0" smtClean="0"/>
@@ -3020,11 +3005,7 @@
             </a:r>
             <a:r>
               <a:rPr lang="fr-FR" dirty="0" smtClean="0"/>
-              <a:t> </a:t>
-            </a:r>
-            <a:r>
-              <a:rPr lang="fr-FR" dirty="0" smtClean="0"/>
-              <a:t>: </a:t>
+              <a:t> : </a:t>
             </a:r>
             <a:r>
               <a:rPr lang="fr-FR" b="1" dirty="0" smtClean="0"/>
@@ -3045,7 +3026,6 @@
               <a:rPr lang="fr-FR" dirty="0" smtClean="0"/>
               <a:t> entré dans l’avion</a:t>
             </a:r>
-            <a:endParaRPr lang="fr-FR" dirty="0" smtClean="0"/>
           </a:p>
           <a:p>
             <a:pPr lvl="1"/>

</xml_diff>